<commit_message>
slides for final presentation update
</commit_message>
<xml_diff>
--- a/src/presentation/EasyBirth_Sales pitch.pptx
+++ b/src/presentation/EasyBirth_Sales pitch.pptx
@@ -5,14 +5,15 @@
     <p:sldMasterId id="2147483648" r:id="rId1"/>
   </p:sldMasterIdLst>
   <p:notesMasterIdLst>
-    <p:notesMasterId r:id="rId7"/>
+    <p:notesMasterId r:id="rId8"/>
   </p:notesMasterIdLst>
   <p:sldIdLst>
     <p:sldId id="256" r:id="rId2"/>
     <p:sldId id="257" r:id="rId3"/>
     <p:sldId id="260" r:id="rId4"/>
     <p:sldId id="258" r:id="rId5"/>
-    <p:sldId id="259" r:id="rId6"/>
+    <p:sldId id="262" r:id="rId6"/>
+    <p:sldId id="259" r:id="rId7"/>
   </p:sldIdLst>
   <p:sldSz cx="12192000" cy="6858000"/>
   <p:notesSz cx="6858000" cy="9144000"/>
@@ -201,7 +202,7 @@
           <a:p>
             <a:fld id="{E3039176-0E38-461A-AF3D-78FCB7DD33B3}" type="datetimeFigureOut">
               <a:rPr lang="de-DE" smtClean="0"/>
-              <a:t>12.12.2019</a:t>
+              <a:t>17.12.19</a:t>
             </a:fld>
             <a:endParaRPr lang="de-DE"/>
           </a:p>
@@ -711,7 +712,7 @@
           <a:p>
             <a:fld id="{BFBD1601-05BD-46B4-A72D-9F42B56DA155}" type="datetimeFigureOut">
               <a:rPr lang="de-DE" smtClean="0"/>
-              <a:t>12.12.2019</a:t>
+              <a:t>17.12.19</a:t>
             </a:fld>
             <a:endParaRPr lang="de-DE"/>
           </a:p>
@@ -911,7 +912,7 @@
           <a:p>
             <a:fld id="{BFBD1601-05BD-46B4-A72D-9F42B56DA155}" type="datetimeFigureOut">
               <a:rPr lang="de-DE" smtClean="0"/>
-              <a:t>12.12.2019</a:t>
+              <a:t>17.12.19</a:t>
             </a:fld>
             <a:endParaRPr lang="de-DE"/>
           </a:p>
@@ -1121,7 +1122,7 @@
           <a:p>
             <a:fld id="{BFBD1601-05BD-46B4-A72D-9F42B56DA155}" type="datetimeFigureOut">
               <a:rPr lang="de-DE" smtClean="0"/>
-              <a:t>12.12.2019</a:t>
+              <a:t>17.12.19</a:t>
             </a:fld>
             <a:endParaRPr lang="de-DE"/>
           </a:p>
@@ -1321,7 +1322,7 @@
           <a:p>
             <a:fld id="{BFBD1601-05BD-46B4-A72D-9F42B56DA155}" type="datetimeFigureOut">
               <a:rPr lang="de-DE" smtClean="0"/>
-              <a:t>12.12.2019</a:t>
+              <a:t>17.12.19</a:t>
             </a:fld>
             <a:endParaRPr lang="de-DE"/>
           </a:p>
@@ -1632,7 +1633,7 @@
           <a:p>
             <a:fld id="{BFBD1601-05BD-46B4-A72D-9F42B56DA155}" type="datetimeFigureOut">
               <a:rPr lang="de-DE" smtClean="0"/>
-              <a:t>12.12.2019</a:t>
+              <a:t>17.12.19</a:t>
             </a:fld>
             <a:endParaRPr lang="de-DE"/>
           </a:p>
@@ -1900,7 +1901,7 @@
           <a:p>
             <a:fld id="{BFBD1601-05BD-46B4-A72D-9F42B56DA155}" type="datetimeFigureOut">
               <a:rPr lang="de-DE" smtClean="0"/>
-              <a:t>12.12.2019</a:t>
+              <a:t>17.12.19</a:t>
             </a:fld>
             <a:endParaRPr lang="de-DE"/>
           </a:p>
@@ -2315,7 +2316,7 @@
           <a:p>
             <a:fld id="{BFBD1601-05BD-46B4-A72D-9F42B56DA155}" type="datetimeFigureOut">
               <a:rPr lang="de-DE" smtClean="0"/>
-              <a:t>12.12.2019</a:t>
+              <a:t>17.12.19</a:t>
             </a:fld>
             <a:endParaRPr lang="de-DE"/>
           </a:p>
@@ -2457,7 +2458,7 @@
           <a:p>
             <a:fld id="{BFBD1601-05BD-46B4-A72D-9F42B56DA155}" type="datetimeFigureOut">
               <a:rPr lang="de-DE" smtClean="0"/>
-              <a:t>12.12.2019</a:t>
+              <a:t>17.12.19</a:t>
             </a:fld>
             <a:endParaRPr lang="de-DE"/>
           </a:p>
@@ -2570,7 +2571,7 @@
           <a:p>
             <a:fld id="{BFBD1601-05BD-46B4-A72D-9F42B56DA155}" type="datetimeFigureOut">
               <a:rPr lang="de-DE" smtClean="0"/>
-              <a:t>12.12.2019</a:t>
+              <a:t>17.12.19</a:t>
             </a:fld>
             <a:endParaRPr lang="de-DE"/>
           </a:p>
@@ -2883,7 +2884,7 @@
           <a:p>
             <a:fld id="{BFBD1601-05BD-46B4-A72D-9F42B56DA155}" type="datetimeFigureOut">
               <a:rPr lang="de-DE" smtClean="0"/>
-              <a:t>12.12.2019</a:t>
+              <a:t>17.12.19</a:t>
             </a:fld>
             <a:endParaRPr lang="de-DE"/>
           </a:p>
@@ -3172,7 +3173,7 @@
           <a:p>
             <a:fld id="{BFBD1601-05BD-46B4-A72D-9F42B56DA155}" type="datetimeFigureOut">
               <a:rPr lang="de-DE" smtClean="0"/>
-              <a:t>12.12.2019</a:t>
+              <a:t>17.12.19</a:t>
             </a:fld>
             <a:endParaRPr lang="de-DE"/>
           </a:p>
@@ -3415,7 +3416,7 @@
           <a:p>
             <a:fld id="{BFBD1601-05BD-46B4-A72D-9F42B56DA155}" type="datetimeFigureOut">
               <a:rPr lang="de-DE" smtClean="0"/>
-              <a:t>12.12.2019</a:t>
+              <a:t>17.12.19</a:t>
             </a:fld>
             <a:endParaRPr lang="de-DE"/>
           </a:p>
@@ -6221,6 +6222,42 @@
           </a:prstGeom>
         </p:spPr>
       </p:pic>
+      <p:pic>
+        <p:nvPicPr>
+          <p:cNvPr id="4" name="Picture 3" descr="A screenshot of a cell phone&#10;&#10;Description automatically generated">
+            <a:extLst>
+              <a:ext uri="{FF2B5EF4-FFF2-40B4-BE49-F238E27FC236}">
+                <a16:creationId xmlns:a16="http://schemas.microsoft.com/office/drawing/2014/main" id="{03C88656-D480-4C44-8921-09171E2B838E}"/>
+              </a:ext>
+            </a:extLst>
+          </p:cNvPr>
+          <p:cNvPicPr>
+            <a:picLocks noChangeAspect="1"/>
+          </p:cNvPicPr>
+          <p:nvPr/>
+        </p:nvPicPr>
+        <p:blipFill>
+          <a:blip r:embed="rId8">
+            <a:extLst>
+              <a:ext uri="{28A0092B-C50C-407E-A947-70E740481C1C}">
+                <a14:useLocalDpi xmlns:a14="http://schemas.microsoft.com/office/drawing/2010/main" val="0"/>
+              </a:ext>
+            </a:extLst>
+          </a:blip>
+          <a:stretch>
+            <a:fillRect/>
+          </a:stretch>
+        </p:blipFill>
+        <p:spPr>
+          <a:xfrm>
+            <a:off x="741098" y="1356096"/>
+            <a:ext cx="10271459" cy="4977629"/>
+          </a:xfrm>
+          <a:prstGeom prst="rect">
+            <a:avLst/>
+          </a:prstGeom>
+        </p:spPr>
+      </p:pic>
     </p:spTree>
     <p:extLst>
       <p:ext uri="{BB962C8B-B14F-4D97-AF65-F5344CB8AC3E}">
@@ -6274,6 +6311,165 @@
           <a:p>
             <a:r>
               <a:rPr lang="de-DE" dirty="0"/>
+              <a:t>The Future</a:t>
+            </a:r>
+          </a:p>
+        </p:txBody>
+      </p:sp>
+      <p:sp>
+        <p:nvSpPr>
+          <p:cNvPr id="3" name="Content Placeholder 2">
+            <a:extLst>
+              <a:ext uri="{FF2B5EF4-FFF2-40B4-BE49-F238E27FC236}">
+                <a16:creationId xmlns:a16="http://schemas.microsoft.com/office/drawing/2014/main" id="{124D0C05-F39F-45FA-AD33-C20531E5C2C8}"/>
+              </a:ext>
+            </a:extLst>
+          </p:cNvPr>
+          <p:cNvSpPr>
+            <a:spLocks noGrp="1"/>
+          </p:cNvSpPr>
+          <p:nvPr>
+            <p:ph idx="1"/>
+          </p:nvPr>
+        </p:nvSpPr>
+        <p:spPr>
+          <a:xfrm>
+            <a:off x="6681216" y="1825625"/>
+            <a:ext cx="4672584" cy="4351338"/>
+          </a:xfrm>
+        </p:spPr>
+        <p:txBody>
+          <a:bodyPr>
+            <a:normAutofit/>
+          </a:bodyPr>
+          <a:lstStyle/>
+          <a:p>
+            <a:r>
+              <a:rPr lang="en-GB" sz="2000" dirty="0"/>
+              <a:t>Simple and easy registration for assessment appointment via Dialogflow</a:t>
+            </a:r>
+          </a:p>
+          <a:p>
+            <a:r>
+              <a:rPr lang="en-GB" sz="2000" dirty="0"/>
+              <a:t>Provide option for face detection service for a seamless and faster labour process</a:t>
+            </a:r>
+          </a:p>
+          <a:p>
+            <a:r>
+              <a:rPr lang="en-GB" sz="2000" dirty="0"/>
+              <a:t>Clarify red or green pathway based on pregnancy assessment decision table</a:t>
+            </a:r>
+          </a:p>
+          <a:p>
+            <a:r>
+              <a:rPr lang="en-GB" sz="2000" dirty="0"/>
+              <a:t>Stored pathway information enable seamless and faster labour process</a:t>
+            </a:r>
+          </a:p>
+          <a:p>
+            <a:r>
+              <a:rPr lang="en-GB" sz="2000" dirty="0"/>
+              <a:t>Modular to-be processes for reuse</a:t>
+            </a:r>
+          </a:p>
+          <a:p>
+            <a:endParaRPr lang="en-GB" sz="2000" dirty="0"/>
+          </a:p>
+          <a:p>
+            <a:endParaRPr lang="en-GB" sz="2000" dirty="0"/>
+          </a:p>
+        </p:txBody>
+      </p:sp>
+      <p:pic>
+        <p:nvPicPr>
+          <p:cNvPr id="4" name="Content Placeholder 4" descr="A screenshot of a cell phone&#10;&#10;Description automatically generated">
+            <a:extLst>
+              <a:ext uri="{FF2B5EF4-FFF2-40B4-BE49-F238E27FC236}">
+                <a16:creationId xmlns:a16="http://schemas.microsoft.com/office/drawing/2014/main" id="{0598E4E0-6242-364B-B604-FAD274B8B063}"/>
+              </a:ext>
+            </a:extLst>
+          </p:cNvPr>
+          <p:cNvPicPr>
+            <a:picLocks noChangeAspect="1"/>
+          </p:cNvPicPr>
+          <p:nvPr/>
+        </p:nvPicPr>
+        <p:blipFill>
+          <a:blip r:embed="rId2">
+            <a:extLst>
+              <a:ext uri="{28A0092B-C50C-407E-A947-70E740481C1C}">
+                <a14:useLocalDpi xmlns:a14="http://schemas.microsoft.com/office/drawing/2010/main" val="0"/>
+              </a:ext>
+            </a:extLst>
+          </a:blip>
+          <a:stretch>
+            <a:fillRect/>
+          </a:stretch>
+        </p:blipFill>
+        <p:spPr>
+          <a:xfrm>
+            <a:off x="704485" y="1462087"/>
+            <a:ext cx="5896798" cy="4546387"/>
+          </a:xfrm>
+          <a:prstGeom prst="rect">
+            <a:avLst/>
+          </a:prstGeom>
+        </p:spPr>
+      </p:pic>
+    </p:spTree>
+    <p:extLst>
+      <p:ext uri="{BB962C8B-B14F-4D97-AF65-F5344CB8AC3E}">
+        <p14:creationId xmlns:p14="http://schemas.microsoft.com/office/powerpoint/2010/main" val="3945252606"/>
+      </p:ext>
+    </p:extLst>
+  </p:cSld>
+  <p:clrMapOvr>
+    <a:masterClrMapping/>
+  </p:clrMapOvr>
+</p:sld>
+</file>
+
+<file path=ppt/slides/slide6.xml><?xml version="1.0" encoding="utf-8"?>
+<p:sld xmlns:a="http://schemas.openxmlformats.org/drawingml/2006/main" xmlns:r="http://schemas.openxmlformats.org/officeDocument/2006/relationships" xmlns:p="http://schemas.openxmlformats.org/presentationml/2006/main">
+  <p:cSld>
+    <p:spTree>
+      <p:nvGrpSpPr>
+        <p:cNvPr id="1" name=""/>
+        <p:cNvGrpSpPr/>
+        <p:nvPr/>
+      </p:nvGrpSpPr>
+      <p:grpSpPr>
+        <a:xfrm>
+          <a:off x="0" y="0"/>
+          <a:ext cx="0" cy="0"/>
+          <a:chOff x="0" y="0"/>
+          <a:chExt cx="0" cy="0"/>
+        </a:xfrm>
+      </p:grpSpPr>
+      <p:sp>
+        <p:nvSpPr>
+          <p:cNvPr id="2" name="Title 1">
+            <a:extLst>
+              <a:ext uri="{FF2B5EF4-FFF2-40B4-BE49-F238E27FC236}">
+                <a16:creationId xmlns:a16="http://schemas.microsoft.com/office/drawing/2014/main" id="{FAC754BC-AFD8-4479-84AC-DA224CB401EC}"/>
+              </a:ext>
+            </a:extLst>
+          </p:cNvPr>
+          <p:cNvSpPr>
+            <a:spLocks noGrp="1"/>
+          </p:cNvSpPr>
+          <p:nvPr>
+            <p:ph type="title"/>
+          </p:nvPr>
+        </p:nvSpPr>
+        <p:spPr/>
+        <p:txBody>
+          <a:bodyPr/>
+          <a:lstStyle/>
+          <a:p>
+            <a:r>
+              <a:rPr lang="de-DE" dirty="0"/>
               <a:t>Live Demo</a:t>
             </a:r>
           </a:p>
@@ -6300,7 +6496,7 @@
           <a:bodyPr/>
           <a:lstStyle/>
           <a:p>
-            <a:endParaRPr lang="de-DE"/>
+            <a:endParaRPr lang="de-DE" dirty="0"/>
           </a:p>
         </p:txBody>
       </p:sp>

</xml_diff>